<commit_message>
adds Protokoll 2 (überarbeitet)
</commit_message>
<xml_diff>
--- a/documentation/Projektstatusmeeting.pptx
+++ b/documentation/Projektstatusmeeting.pptx
@@ -6,9 +6,11 @@
   </p:sldMasterIdLst>
   <p:sldIdLst>
     <p:sldId id="256" r:id="rId2"/>
-    <p:sldId id="259" r:id="rId3"/>
-    <p:sldId id="257" r:id="rId4"/>
-    <p:sldId id="258" r:id="rId5"/>
+    <p:sldId id="257" r:id="rId3"/>
+    <p:sldId id="260" r:id="rId4"/>
+    <p:sldId id="259" r:id="rId5"/>
+    <p:sldId id="261" r:id="rId6"/>
+    <p:sldId id="258" r:id="rId7"/>
   </p:sldIdLst>
   <p:sldSz cx="12192000" cy="6858000"/>
   <p:notesSz cx="6858000" cy="9144000"/>
@@ -117,6 +119,820 @@
 
 <file path=ppt/revisionInfo.xml><?xml version="1.0" encoding="utf-8"?>
 <p1510:revInfo xmlns:a="http://schemas.openxmlformats.org/drawingml/2006/main" xmlns:r="http://schemas.openxmlformats.org/officeDocument/2006/relationships" xmlns:p1510="http://schemas.microsoft.com/office/powerpoint/2015/10/main"/>
+</file>
+
+<file path=ppt/charts/chart1.xml><?xml version="1.0" encoding="utf-8"?>
+<c:chartSpace xmlns:c="http://schemas.openxmlformats.org/drawingml/2006/chart" xmlns:a="http://schemas.openxmlformats.org/drawingml/2006/main" xmlns:r="http://schemas.openxmlformats.org/officeDocument/2006/relationships" xmlns:c16r2="http://schemas.microsoft.com/office/drawing/2015/06/chart">
+  <c:date1904 val="0"/>
+  <c:lang val="de-DE"/>
+  <c:roundedCorners val="0"/>
+  <mc:AlternateContent xmlns:mc="http://schemas.openxmlformats.org/markup-compatibility/2006">
+    <mc:Choice xmlns:c14="http://schemas.microsoft.com/office/drawing/2007/8/2/chart" Requires="c14">
+      <c14:style val="102"/>
+    </mc:Choice>
+    <mc:Fallback>
+      <c:style val="2"/>
+    </mc:Fallback>
+  </mc:AlternateContent>
+  <c:chart>
+    <c:autoTitleDeleted val="1"/>
+    <c:plotArea>
+      <c:layout/>
+      <c:barChart>
+        <c:barDir val="col"/>
+        <c:grouping val="clustered"/>
+        <c:varyColors val="0"/>
+        <c:ser>
+          <c:idx val="0"/>
+          <c:order val="0"/>
+          <c:tx>
+            <c:v>% Abgeschlossen</c:v>
+          </c:tx>
+          <c:spPr>
+            <a:solidFill>
+              <a:schemeClr val="accent1"/>
+            </a:solidFill>
+            <a:ln>
+              <a:noFill/>
+            </a:ln>
+            <a:effectLst/>
+          </c:spPr>
+          <c:invertIfNegative val="0"/>
+          <c:cat>
+            <c:strLit>
+              <c:ptCount val="5"/>
+              <c:pt idx="0">
+                <c:v>Lastenheft</c:v>
+              </c:pt>
+              <c:pt idx="1">
+                <c:v>Technologie auswählen/Projekt einrichten</c:v>
+              </c:pt>
+              <c:pt idx="2">
+                <c:v>Oberflächen in html umsetzen</c:v>
+              </c:pt>
+              <c:pt idx="3">
+                <c:v>Datenbank</c:v>
+              </c:pt>
+              <c:pt idx="4">
+                <c:v>Implementierung</c:v>
+              </c:pt>
+            </c:strLit>
+          </c:cat>
+          <c:val>
+            <c:numLit>
+              <c:formatCode>#,##0"%"</c:formatCode>
+              <c:ptCount val="5"/>
+              <c:pt idx="0">
+                <c:v>54</c:v>
+              </c:pt>
+              <c:pt idx="1">
+                <c:v>75</c:v>
+              </c:pt>
+              <c:pt idx="2">
+                <c:v>0</c:v>
+              </c:pt>
+              <c:pt idx="3">
+                <c:v>30</c:v>
+              </c:pt>
+              <c:pt idx="4">
+                <c:v>13</c:v>
+              </c:pt>
+            </c:numLit>
+          </c:val>
+          <c:extLst>
+            <c:ext xmlns:c16="http://schemas.microsoft.com/office/drawing/2014/chart" uri="{C3380CC4-5D6E-409C-BE32-E72D297353CC}">
+              <c16:uniqueId val="{00000000-5A1C-4F5F-9E4B-36828B32BC27}"/>
+            </c:ext>
+          </c:extLst>
+        </c:ser>
+        <c:dLbls>
+          <c:showLegendKey val="0"/>
+          <c:showVal val="0"/>
+          <c:showCatName val="0"/>
+          <c:showSerName val="0"/>
+          <c:showPercent val="0"/>
+          <c:showBubbleSize val="0"/>
+        </c:dLbls>
+        <c:gapWidth val="219"/>
+        <c:overlap val="-27"/>
+        <c:axId val="-103849312"/>
+        <c:axId val="-103827008"/>
+      </c:barChart>
+      <c:catAx>
+        <c:axId val="-103849312"/>
+        <c:scaling>
+          <c:orientation val="minMax"/>
+        </c:scaling>
+        <c:delete val="0"/>
+        <c:axPos val="b"/>
+        <c:numFmt formatCode="General" sourceLinked="1"/>
+        <c:majorTickMark val="none"/>
+        <c:minorTickMark val="none"/>
+        <c:tickLblPos val="nextTo"/>
+        <c:spPr>
+          <a:noFill/>
+          <a:ln w="9525" cap="flat" cmpd="sng" algn="ctr">
+            <a:solidFill>
+              <a:schemeClr val="tx1">
+                <a:lumMod val="15000"/>
+                <a:lumOff val="85000"/>
+              </a:schemeClr>
+            </a:solidFill>
+            <a:round/>
+          </a:ln>
+          <a:effectLst/>
+        </c:spPr>
+        <c:txPr>
+          <a:bodyPr rot="-60000000" spcFirstLastPara="1" vertOverflow="ellipsis" vert="horz" wrap="square" anchor="ctr" anchorCtr="1"/>
+          <a:lstStyle/>
+          <a:p>
+            <a:pPr>
+              <a:defRPr sz="1400" b="0" i="0" u="none" strike="noStrike" kern="1200" baseline="0">
+                <a:solidFill>
+                  <a:schemeClr val="tx1">
+                    <a:lumMod val="65000"/>
+                    <a:lumOff val="35000"/>
+                  </a:schemeClr>
+                </a:solidFill>
+                <a:latin typeface="+mn-lt"/>
+                <a:ea typeface="+mn-ea"/>
+                <a:cs typeface="+mn-cs"/>
+              </a:defRPr>
+            </a:pPr>
+            <a:endParaRPr lang="de-DE"/>
+          </a:p>
+        </c:txPr>
+        <c:crossAx val="-103827008"/>
+        <c:crosses val="autoZero"/>
+        <c:auto val="1"/>
+        <c:lblAlgn val="ctr"/>
+        <c:lblOffset val="100"/>
+        <c:noMultiLvlLbl val="0"/>
+      </c:catAx>
+      <c:valAx>
+        <c:axId val="-103827008"/>
+        <c:scaling>
+          <c:orientation val="minMax"/>
+        </c:scaling>
+        <c:delete val="0"/>
+        <c:axPos val="l"/>
+        <c:majorGridlines>
+          <c:spPr>
+            <a:ln w="9525" cap="flat" cmpd="sng" algn="ctr">
+              <a:solidFill>
+                <a:schemeClr val="tx1">
+                  <a:lumMod val="15000"/>
+                  <a:lumOff val="85000"/>
+                </a:schemeClr>
+              </a:solidFill>
+              <a:round/>
+            </a:ln>
+            <a:effectLst/>
+          </c:spPr>
+        </c:majorGridlines>
+        <c:numFmt formatCode="#,##0&quot;%&quot;" sourceLinked="1"/>
+        <c:majorTickMark val="none"/>
+        <c:minorTickMark val="none"/>
+        <c:tickLblPos val="nextTo"/>
+        <c:spPr>
+          <a:noFill/>
+          <a:ln>
+            <a:noFill/>
+          </a:ln>
+          <a:effectLst/>
+        </c:spPr>
+        <c:txPr>
+          <a:bodyPr rot="-60000000" spcFirstLastPara="1" vertOverflow="ellipsis" vert="horz" wrap="square" anchor="ctr" anchorCtr="1"/>
+          <a:lstStyle/>
+          <a:p>
+            <a:pPr>
+              <a:defRPr sz="900" b="0" i="0" u="none" strike="noStrike" kern="1200" baseline="0">
+                <a:solidFill>
+                  <a:schemeClr val="tx1">
+                    <a:lumMod val="65000"/>
+                    <a:lumOff val="35000"/>
+                  </a:schemeClr>
+                </a:solidFill>
+                <a:latin typeface="+mn-lt"/>
+                <a:ea typeface="+mn-ea"/>
+                <a:cs typeface="+mn-cs"/>
+              </a:defRPr>
+            </a:pPr>
+            <a:endParaRPr lang="de-DE"/>
+          </a:p>
+        </c:txPr>
+        <c:crossAx val="-103849312"/>
+        <c:crosses val="autoZero"/>
+        <c:crossBetween val="between"/>
+      </c:valAx>
+      <c:spPr>
+        <a:noFill/>
+        <a:ln>
+          <a:noFill/>
+        </a:ln>
+        <a:effectLst/>
+      </c:spPr>
+      <c:extLst/>
+    </c:plotArea>
+    <c:legend>
+      <c:legendPos val="b"/>
+      <c:overlay val="0"/>
+      <c:spPr>
+        <a:noFill/>
+        <a:ln>
+          <a:noFill/>
+        </a:ln>
+        <a:effectLst/>
+      </c:spPr>
+      <c:txPr>
+        <a:bodyPr rot="0" spcFirstLastPara="1" vertOverflow="ellipsis" vert="horz" wrap="square" anchor="ctr" anchorCtr="1"/>
+        <a:lstStyle/>
+        <a:p>
+          <a:pPr>
+            <a:defRPr sz="1400" b="0" i="0" u="none" strike="noStrike" kern="1200" baseline="0">
+              <a:solidFill>
+                <a:schemeClr val="tx1">
+                  <a:lumMod val="65000"/>
+                  <a:lumOff val="35000"/>
+                </a:schemeClr>
+              </a:solidFill>
+              <a:latin typeface="+mn-lt"/>
+              <a:ea typeface="+mn-ea"/>
+              <a:cs typeface="+mn-cs"/>
+            </a:defRPr>
+          </a:pPr>
+          <a:endParaRPr lang="de-DE"/>
+        </a:p>
+      </c:txPr>
+    </c:legend>
+    <c:plotVisOnly val="1"/>
+    <c:dispBlanksAs val="gap"/>
+    <c:showDLblsOverMax val="0"/>
+  </c:chart>
+  <c:spPr>
+    <a:noFill/>
+    <a:ln>
+      <a:noFill/>
+    </a:ln>
+    <a:effectLst/>
+  </c:spPr>
+  <c:txPr>
+    <a:bodyPr/>
+    <a:lstStyle/>
+    <a:p>
+      <a:pPr>
+        <a:defRPr/>
+      </a:pPr>
+      <a:endParaRPr lang="de-DE"/>
+    </a:p>
+  </c:txPr>
+  <c:externalData r:id="rId3">
+    <c:autoUpdate val="0"/>
+  </c:externalData>
+</c:chartSpace>
+</file>
+
+<file path=ppt/charts/colors1.xml><?xml version="1.0" encoding="utf-8"?>
+<cs:colorStyle xmlns:cs="http://schemas.microsoft.com/office/drawing/2012/chartStyle" xmlns:a="http://schemas.openxmlformats.org/drawingml/2006/main" meth="cycle" id="10">
+  <a:schemeClr val="accent1"/>
+  <a:schemeClr val="accent2"/>
+  <a:schemeClr val="accent3"/>
+  <a:schemeClr val="accent4"/>
+  <a:schemeClr val="accent5"/>
+  <a:schemeClr val="accent6"/>
+  <cs:variation/>
+  <cs:variation>
+    <a:lumMod val="60000"/>
+  </cs:variation>
+  <cs:variation>
+    <a:lumMod val="80000"/>
+    <a:lumOff val="20000"/>
+  </cs:variation>
+  <cs:variation>
+    <a:lumMod val="80000"/>
+  </cs:variation>
+  <cs:variation>
+    <a:lumMod val="60000"/>
+    <a:lumOff val="40000"/>
+  </cs:variation>
+  <cs:variation>
+    <a:lumMod val="50000"/>
+  </cs:variation>
+  <cs:variation>
+    <a:lumMod val="70000"/>
+    <a:lumOff val="30000"/>
+  </cs:variation>
+  <cs:variation>
+    <a:lumMod val="70000"/>
+  </cs:variation>
+  <cs:variation>
+    <a:lumMod val="50000"/>
+    <a:lumOff val="50000"/>
+  </cs:variation>
+</cs:colorStyle>
+</file>
+
+<file path=ppt/charts/style1.xml><?xml version="1.0" encoding="utf-8"?>
+<cs:chartStyle xmlns:cs="http://schemas.microsoft.com/office/drawing/2012/chartStyle" xmlns:a="http://schemas.openxmlformats.org/drawingml/2006/main" id="201">
+  <cs:axisTitle>
+    <cs:lnRef idx="0"/>
+    <cs:fillRef idx="0"/>
+    <cs:effectRef idx="0"/>
+    <cs:fontRef idx="minor">
+      <a:schemeClr val="tx1">
+        <a:lumMod val="65000"/>
+        <a:lumOff val="35000"/>
+      </a:schemeClr>
+    </cs:fontRef>
+    <cs:defRPr sz="1000" kern="1200"/>
+  </cs:axisTitle>
+  <cs:categoryAxis>
+    <cs:lnRef idx="0"/>
+    <cs:fillRef idx="0"/>
+    <cs:effectRef idx="0"/>
+    <cs:fontRef idx="minor">
+      <a:schemeClr val="tx1">
+        <a:lumMod val="65000"/>
+        <a:lumOff val="35000"/>
+      </a:schemeClr>
+    </cs:fontRef>
+    <cs:spPr>
+      <a:ln w="9525" cap="flat" cmpd="sng" algn="ctr">
+        <a:solidFill>
+          <a:schemeClr val="tx1">
+            <a:lumMod val="15000"/>
+            <a:lumOff val="85000"/>
+          </a:schemeClr>
+        </a:solidFill>
+        <a:round/>
+      </a:ln>
+    </cs:spPr>
+    <cs:defRPr sz="900" kern="1200"/>
+  </cs:categoryAxis>
+  <cs:chartArea mods="allowNoFillOverride allowNoLineOverride">
+    <cs:lnRef idx="0"/>
+    <cs:fillRef idx="0"/>
+    <cs:effectRef idx="0"/>
+    <cs:fontRef idx="minor">
+      <a:schemeClr val="tx1"/>
+    </cs:fontRef>
+    <cs:spPr>
+      <a:solidFill>
+        <a:schemeClr val="bg1"/>
+      </a:solidFill>
+      <a:ln w="9525" cap="flat" cmpd="sng" algn="ctr">
+        <a:solidFill>
+          <a:schemeClr val="tx1">
+            <a:lumMod val="15000"/>
+            <a:lumOff val="85000"/>
+          </a:schemeClr>
+        </a:solidFill>
+        <a:round/>
+      </a:ln>
+    </cs:spPr>
+    <cs:defRPr sz="1000" kern="1200"/>
+  </cs:chartArea>
+  <cs:dataLabel>
+    <cs:lnRef idx="0"/>
+    <cs:fillRef idx="0"/>
+    <cs:effectRef idx="0"/>
+    <cs:fontRef idx="minor">
+      <a:schemeClr val="tx1">
+        <a:lumMod val="75000"/>
+        <a:lumOff val="25000"/>
+      </a:schemeClr>
+    </cs:fontRef>
+    <cs:defRPr sz="900" kern="1200"/>
+  </cs:dataLabel>
+  <cs:dataLabelCallout>
+    <cs:lnRef idx="0"/>
+    <cs:fillRef idx="0"/>
+    <cs:effectRef idx="0"/>
+    <cs:fontRef idx="minor">
+      <a:schemeClr val="dk1">
+        <a:lumMod val="65000"/>
+        <a:lumOff val="35000"/>
+      </a:schemeClr>
+    </cs:fontRef>
+    <cs:spPr>
+      <a:solidFill>
+        <a:schemeClr val="lt1"/>
+      </a:solidFill>
+      <a:ln>
+        <a:solidFill>
+          <a:schemeClr val="dk1">
+            <a:lumMod val="25000"/>
+            <a:lumOff val="75000"/>
+          </a:schemeClr>
+        </a:solidFill>
+      </a:ln>
+    </cs:spPr>
+    <cs:defRPr sz="900" kern="1200"/>
+    <cs:bodyPr rot="0" spcFirstLastPara="1" vertOverflow="clip" horzOverflow="clip" vert="horz" wrap="square" lIns="36576" tIns="18288" rIns="36576" bIns="18288" anchor="ctr" anchorCtr="1">
+      <a:spAutoFit/>
+    </cs:bodyPr>
+  </cs:dataLabelCallout>
+  <cs:dataPoint>
+    <cs:lnRef idx="0"/>
+    <cs:fillRef idx="1">
+      <cs:styleClr val="auto"/>
+    </cs:fillRef>
+    <cs:effectRef idx="0"/>
+    <cs:fontRef idx="minor">
+      <a:schemeClr val="tx1"/>
+    </cs:fontRef>
+  </cs:dataPoint>
+  <cs:dataPoint3D>
+    <cs:lnRef idx="0"/>
+    <cs:fillRef idx="1">
+      <cs:styleClr val="auto"/>
+    </cs:fillRef>
+    <cs:effectRef idx="0"/>
+    <cs:fontRef idx="minor">
+      <a:schemeClr val="tx1"/>
+    </cs:fontRef>
+  </cs:dataPoint3D>
+  <cs:dataPointLine>
+    <cs:lnRef idx="0">
+      <cs:styleClr val="auto"/>
+    </cs:lnRef>
+    <cs:fillRef idx="1"/>
+    <cs:effectRef idx="0"/>
+    <cs:fontRef idx="minor">
+      <a:schemeClr val="tx1"/>
+    </cs:fontRef>
+    <cs:spPr>
+      <a:ln w="28575" cap="rnd">
+        <a:solidFill>
+          <a:schemeClr val="phClr"/>
+        </a:solidFill>
+        <a:round/>
+      </a:ln>
+    </cs:spPr>
+  </cs:dataPointLine>
+  <cs:dataPointMarker>
+    <cs:lnRef idx="0">
+      <cs:styleClr val="auto"/>
+    </cs:lnRef>
+    <cs:fillRef idx="1">
+      <cs:styleClr val="auto"/>
+    </cs:fillRef>
+    <cs:effectRef idx="0"/>
+    <cs:fontRef idx="minor">
+      <a:schemeClr val="tx1"/>
+    </cs:fontRef>
+    <cs:spPr>
+      <a:ln w="9525">
+        <a:solidFill>
+          <a:schemeClr val="phClr"/>
+        </a:solidFill>
+      </a:ln>
+    </cs:spPr>
+  </cs:dataPointMarker>
+  <cs:dataPointMarkerLayout symbol="circle" size="5"/>
+  <cs:dataPointWireframe>
+    <cs:lnRef idx="0">
+      <cs:styleClr val="auto"/>
+    </cs:lnRef>
+    <cs:fillRef idx="1"/>
+    <cs:effectRef idx="0"/>
+    <cs:fontRef idx="minor">
+      <a:schemeClr val="tx1"/>
+    </cs:fontRef>
+    <cs:spPr>
+      <a:ln w="9525" cap="rnd">
+        <a:solidFill>
+          <a:schemeClr val="phClr"/>
+        </a:solidFill>
+        <a:round/>
+      </a:ln>
+    </cs:spPr>
+  </cs:dataPointWireframe>
+  <cs:dataTable>
+    <cs:lnRef idx="0"/>
+    <cs:fillRef idx="0"/>
+    <cs:effectRef idx="0"/>
+    <cs:fontRef idx="minor">
+      <a:schemeClr val="tx1">
+        <a:lumMod val="65000"/>
+        <a:lumOff val="35000"/>
+      </a:schemeClr>
+    </cs:fontRef>
+    <cs:spPr>
+      <a:noFill/>
+      <a:ln w="9525" cap="flat" cmpd="sng" algn="ctr">
+        <a:solidFill>
+          <a:schemeClr val="tx1">
+            <a:lumMod val="15000"/>
+            <a:lumOff val="85000"/>
+          </a:schemeClr>
+        </a:solidFill>
+        <a:round/>
+      </a:ln>
+    </cs:spPr>
+    <cs:defRPr sz="900" kern="1200"/>
+  </cs:dataTable>
+  <cs:downBar>
+    <cs:lnRef idx="0"/>
+    <cs:fillRef idx="0"/>
+    <cs:effectRef idx="0"/>
+    <cs:fontRef idx="minor">
+      <a:schemeClr val="dk1"/>
+    </cs:fontRef>
+    <cs:spPr>
+      <a:solidFill>
+        <a:schemeClr val="dk1">
+          <a:lumMod val="65000"/>
+          <a:lumOff val="35000"/>
+        </a:schemeClr>
+      </a:solidFill>
+      <a:ln w="9525">
+        <a:solidFill>
+          <a:schemeClr val="tx1">
+            <a:lumMod val="65000"/>
+            <a:lumOff val="35000"/>
+          </a:schemeClr>
+        </a:solidFill>
+      </a:ln>
+    </cs:spPr>
+  </cs:downBar>
+  <cs:dropLine>
+    <cs:lnRef idx="0"/>
+    <cs:fillRef idx="0"/>
+    <cs:effectRef idx="0"/>
+    <cs:fontRef idx="minor">
+      <a:schemeClr val="tx1"/>
+    </cs:fontRef>
+    <cs:spPr>
+      <a:ln w="9525" cap="flat" cmpd="sng" algn="ctr">
+        <a:solidFill>
+          <a:schemeClr val="tx1">
+            <a:lumMod val="35000"/>
+            <a:lumOff val="65000"/>
+          </a:schemeClr>
+        </a:solidFill>
+        <a:round/>
+      </a:ln>
+    </cs:spPr>
+  </cs:dropLine>
+  <cs:errorBar>
+    <cs:lnRef idx="0"/>
+    <cs:fillRef idx="0"/>
+    <cs:effectRef idx="0"/>
+    <cs:fontRef idx="minor">
+      <a:schemeClr val="tx1"/>
+    </cs:fontRef>
+    <cs:spPr>
+      <a:ln w="9525" cap="flat" cmpd="sng" algn="ctr">
+        <a:solidFill>
+          <a:schemeClr val="tx1">
+            <a:lumMod val="65000"/>
+            <a:lumOff val="35000"/>
+          </a:schemeClr>
+        </a:solidFill>
+        <a:round/>
+      </a:ln>
+    </cs:spPr>
+  </cs:errorBar>
+  <cs:floor>
+    <cs:lnRef idx="0"/>
+    <cs:fillRef idx="0"/>
+    <cs:effectRef idx="0"/>
+    <cs:fontRef idx="minor">
+      <a:schemeClr val="tx1"/>
+    </cs:fontRef>
+    <cs:spPr>
+      <a:noFill/>
+      <a:ln>
+        <a:noFill/>
+      </a:ln>
+    </cs:spPr>
+  </cs:floor>
+  <cs:gridlineMajor>
+    <cs:lnRef idx="0"/>
+    <cs:fillRef idx="0"/>
+    <cs:effectRef idx="0"/>
+    <cs:fontRef idx="minor">
+      <a:schemeClr val="tx1"/>
+    </cs:fontRef>
+    <cs:spPr>
+      <a:ln w="9525" cap="flat" cmpd="sng" algn="ctr">
+        <a:solidFill>
+          <a:schemeClr val="tx1">
+            <a:lumMod val="15000"/>
+            <a:lumOff val="85000"/>
+          </a:schemeClr>
+        </a:solidFill>
+        <a:round/>
+      </a:ln>
+    </cs:spPr>
+  </cs:gridlineMajor>
+  <cs:gridlineMinor>
+    <cs:lnRef idx="0"/>
+    <cs:fillRef idx="0"/>
+    <cs:effectRef idx="0"/>
+    <cs:fontRef idx="minor">
+      <a:schemeClr val="tx1"/>
+    </cs:fontRef>
+    <cs:spPr>
+      <a:ln w="9525" cap="flat" cmpd="sng" algn="ctr">
+        <a:solidFill>
+          <a:schemeClr val="tx1">
+            <a:lumMod val="5000"/>
+            <a:lumOff val="95000"/>
+          </a:schemeClr>
+        </a:solidFill>
+        <a:round/>
+      </a:ln>
+    </cs:spPr>
+  </cs:gridlineMinor>
+  <cs:hiLoLine>
+    <cs:lnRef idx="0"/>
+    <cs:fillRef idx="0"/>
+    <cs:effectRef idx="0"/>
+    <cs:fontRef idx="minor">
+      <a:schemeClr val="tx1"/>
+    </cs:fontRef>
+    <cs:spPr>
+      <a:ln w="9525" cap="flat" cmpd="sng" algn="ctr">
+        <a:solidFill>
+          <a:schemeClr val="tx1">
+            <a:lumMod val="75000"/>
+            <a:lumOff val="25000"/>
+          </a:schemeClr>
+        </a:solidFill>
+        <a:round/>
+      </a:ln>
+    </cs:spPr>
+  </cs:hiLoLine>
+  <cs:leaderLine>
+    <cs:lnRef idx="0"/>
+    <cs:fillRef idx="0"/>
+    <cs:effectRef idx="0"/>
+    <cs:fontRef idx="minor">
+      <a:schemeClr val="tx1"/>
+    </cs:fontRef>
+    <cs:spPr>
+      <a:ln w="9525" cap="flat" cmpd="sng" algn="ctr">
+        <a:solidFill>
+          <a:schemeClr val="tx1">
+            <a:lumMod val="35000"/>
+            <a:lumOff val="65000"/>
+          </a:schemeClr>
+        </a:solidFill>
+        <a:round/>
+      </a:ln>
+    </cs:spPr>
+  </cs:leaderLine>
+  <cs:legend>
+    <cs:lnRef idx="0"/>
+    <cs:fillRef idx="0"/>
+    <cs:effectRef idx="0"/>
+    <cs:fontRef idx="minor">
+      <a:schemeClr val="tx1">
+        <a:lumMod val="65000"/>
+        <a:lumOff val="35000"/>
+      </a:schemeClr>
+    </cs:fontRef>
+    <cs:defRPr sz="900" kern="1200"/>
+  </cs:legend>
+  <cs:plotArea mods="allowNoFillOverride allowNoLineOverride">
+    <cs:lnRef idx="0"/>
+    <cs:fillRef idx="0"/>
+    <cs:effectRef idx="0"/>
+    <cs:fontRef idx="minor">
+      <a:schemeClr val="tx1"/>
+    </cs:fontRef>
+  </cs:plotArea>
+  <cs:plotArea3D mods="allowNoFillOverride allowNoLineOverride">
+    <cs:lnRef idx="0"/>
+    <cs:fillRef idx="0"/>
+    <cs:effectRef idx="0"/>
+    <cs:fontRef idx="minor">
+      <a:schemeClr val="tx1"/>
+    </cs:fontRef>
+  </cs:plotArea3D>
+  <cs:seriesAxis>
+    <cs:lnRef idx="0"/>
+    <cs:fillRef idx="0"/>
+    <cs:effectRef idx="0"/>
+    <cs:fontRef idx="minor">
+      <a:schemeClr val="tx1">
+        <a:lumMod val="65000"/>
+        <a:lumOff val="35000"/>
+      </a:schemeClr>
+    </cs:fontRef>
+    <cs:defRPr sz="900" kern="1200"/>
+  </cs:seriesAxis>
+  <cs:seriesLine>
+    <cs:lnRef idx="0"/>
+    <cs:fillRef idx="0"/>
+    <cs:effectRef idx="0"/>
+    <cs:fontRef idx="minor">
+      <a:schemeClr val="tx1"/>
+    </cs:fontRef>
+    <cs:spPr>
+      <a:ln w="9525" cap="flat" cmpd="sng" algn="ctr">
+        <a:solidFill>
+          <a:schemeClr val="tx1">
+            <a:lumMod val="35000"/>
+            <a:lumOff val="65000"/>
+          </a:schemeClr>
+        </a:solidFill>
+        <a:round/>
+      </a:ln>
+    </cs:spPr>
+  </cs:seriesLine>
+  <cs:title>
+    <cs:lnRef idx="0"/>
+    <cs:fillRef idx="0"/>
+    <cs:effectRef idx="0"/>
+    <cs:fontRef idx="minor">
+      <a:schemeClr val="tx1">
+        <a:lumMod val="65000"/>
+        <a:lumOff val="35000"/>
+      </a:schemeClr>
+    </cs:fontRef>
+    <cs:defRPr sz="1400" b="0" kern="1200" spc="0" baseline="0"/>
+  </cs:title>
+  <cs:trendline>
+    <cs:lnRef idx="0">
+      <cs:styleClr val="auto"/>
+    </cs:lnRef>
+    <cs:fillRef idx="0"/>
+    <cs:effectRef idx="0"/>
+    <cs:fontRef idx="minor">
+      <a:schemeClr val="tx1"/>
+    </cs:fontRef>
+    <cs:spPr>
+      <a:ln w="19050" cap="rnd">
+        <a:solidFill>
+          <a:schemeClr val="phClr"/>
+        </a:solidFill>
+        <a:prstDash val="sysDot"/>
+      </a:ln>
+    </cs:spPr>
+  </cs:trendline>
+  <cs:trendlineLabel>
+    <cs:lnRef idx="0"/>
+    <cs:fillRef idx="0"/>
+    <cs:effectRef idx="0"/>
+    <cs:fontRef idx="minor">
+      <a:schemeClr val="tx1">
+        <a:lumMod val="65000"/>
+        <a:lumOff val="35000"/>
+      </a:schemeClr>
+    </cs:fontRef>
+    <cs:defRPr sz="900" kern="1200"/>
+  </cs:trendlineLabel>
+  <cs:upBar>
+    <cs:lnRef idx="0"/>
+    <cs:fillRef idx="0"/>
+    <cs:effectRef idx="0"/>
+    <cs:fontRef idx="minor">
+      <a:schemeClr val="dk1"/>
+    </cs:fontRef>
+    <cs:spPr>
+      <a:solidFill>
+        <a:schemeClr val="lt1"/>
+      </a:solidFill>
+      <a:ln w="9525">
+        <a:solidFill>
+          <a:schemeClr val="tx1">
+            <a:lumMod val="15000"/>
+            <a:lumOff val="85000"/>
+          </a:schemeClr>
+        </a:solidFill>
+      </a:ln>
+    </cs:spPr>
+  </cs:upBar>
+  <cs:valueAxis>
+    <cs:lnRef idx="0"/>
+    <cs:fillRef idx="0"/>
+    <cs:effectRef idx="0"/>
+    <cs:fontRef idx="minor">
+      <a:schemeClr val="tx1">
+        <a:lumMod val="65000"/>
+        <a:lumOff val="35000"/>
+      </a:schemeClr>
+    </cs:fontRef>
+    <cs:defRPr sz="900" kern="1200"/>
+  </cs:valueAxis>
+  <cs:wall>
+    <cs:lnRef idx="0"/>
+    <cs:fillRef idx="0"/>
+    <cs:effectRef idx="0"/>
+    <cs:fontRef idx="minor">
+      <a:schemeClr val="tx1"/>
+    </cs:fontRef>
+    <cs:spPr>
+      <a:noFill/>
+      <a:ln>
+        <a:noFill/>
+      </a:ln>
+    </cs:spPr>
+  </cs:wall>
+</cs:chartStyle>
 </file>
 
 <file path=ppt/slideLayouts/slideLayout1.xml><?xml version="1.0" encoding="utf-8"?>
@@ -841,7 +1657,7 @@
           <a:p>
             <a:fld id="{7E4B12FC-B41C-4527-A942-44ADBFB5AA4E}" type="datetimeFigureOut">
               <a:rPr lang="de-DE" smtClean="0"/>
-              <a:t>09.11.2017</a:t>
+              <a:t>16.11.2017</a:t>
             </a:fld>
             <a:endParaRPr lang="de-DE"/>
           </a:p>
@@ -1092,7 +1908,7 @@
           <a:p>
             <a:fld id="{7E4B12FC-B41C-4527-A942-44ADBFB5AA4E}" type="datetimeFigureOut">
               <a:rPr lang="de-DE" smtClean="0"/>
-              <a:t>09.11.2017</a:t>
+              <a:t>16.11.2017</a:t>
             </a:fld>
             <a:endParaRPr lang="de-DE"/>
           </a:p>
@@ -1406,7 +2222,7 @@
           <a:p>
             <a:fld id="{7E4B12FC-B41C-4527-A942-44ADBFB5AA4E}" type="datetimeFigureOut">
               <a:rPr lang="de-DE" smtClean="0"/>
-              <a:t>09.11.2017</a:t>
+              <a:t>16.11.2017</a:t>
             </a:fld>
             <a:endParaRPr lang="de-DE"/>
           </a:p>
@@ -1747,7 +2563,7 @@
           <a:p>
             <a:fld id="{7E4B12FC-B41C-4527-A942-44ADBFB5AA4E}" type="datetimeFigureOut">
               <a:rPr lang="de-DE" smtClean="0"/>
-              <a:t>09.11.2017</a:t>
+              <a:t>16.11.2017</a:t>
             </a:fld>
             <a:endParaRPr lang="de-DE"/>
           </a:p>
@@ -2061,7 +2877,7 @@
           <a:p>
             <a:fld id="{7E4B12FC-B41C-4527-A942-44ADBFB5AA4E}" type="datetimeFigureOut">
               <a:rPr lang="de-DE" smtClean="0"/>
-              <a:t>09.11.2017</a:t>
+              <a:t>16.11.2017</a:t>
             </a:fld>
             <a:endParaRPr lang="de-DE"/>
           </a:p>
@@ -2454,7 +3270,7 @@
           <a:p>
             <a:fld id="{7E4B12FC-B41C-4527-A942-44ADBFB5AA4E}" type="datetimeFigureOut">
               <a:rPr lang="de-DE" smtClean="0"/>
-              <a:t>09.11.2017</a:t>
+              <a:t>16.11.2017</a:t>
             </a:fld>
             <a:endParaRPr lang="de-DE"/>
           </a:p>
@@ -2624,7 +3440,7 @@
           <a:p>
             <a:fld id="{7E4B12FC-B41C-4527-A942-44ADBFB5AA4E}" type="datetimeFigureOut">
               <a:rPr lang="de-DE" smtClean="0"/>
-              <a:t>09.11.2017</a:t>
+              <a:t>16.11.2017</a:t>
             </a:fld>
             <a:endParaRPr lang="de-DE"/>
           </a:p>
@@ -2804,7 +3620,7 @@
           <a:p>
             <a:fld id="{7E4B12FC-B41C-4527-A942-44ADBFB5AA4E}" type="datetimeFigureOut">
               <a:rPr lang="de-DE" smtClean="0"/>
-              <a:t>09.11.2017</a:t>
+              <a:t>16.11.2017</a:t>
             </a:fld>
             <a:endParaRPr lang="de-DE"/>
           </a:p>
@@ -2980,7 +3796,7 @@
           <a:p>
             <a:fld id="{7E4B12FC-B41C-4527-A942-44ADBFB5AA4E}" type="datetimeFigureOut">
               <a:rPr lang="de-DE" smtClean="0"/>
-              <a:t>09.11.2017</a:t>
+              <a:t>16.11.2017</a:t>
             </a:fld>
             <a:endParaRPr lang="de-DE"/>
           </a:p>
@@ -3227,7 +4043,7 @@
           <a:p>
             <a:fld id="{7E4B12FC-B41C-4527-A942-44ADBFB5AA4E}" type="datetimeFigureOut">
               <a:rPr lang="de-DE" smtClean="0"/>
-              <a:t>09.11.2017</a:t>
+              <a:t>16.11.2017</a:t>
             </a:fld>
             <a:endParaRPr lang="de-DE"/>
           </a:p>
@@ -3459,7 +4275,7 @@
           <a:p>
             <a:fld id="{7E4B12FC-B41C-4527-A942-44ADBFB5AA4E}" type="datetimeFigureOut">
               <a:rPr lang="de-DE" smtClean="0"/>
-              <a:t>09.11.2017</a:t>
+              <a:t>16.11.2017</a:t>
             </a:fld>
             <a:endParaRPr lang="de-DE"/>
           </a:p>
@@ -3833,7 +4649,7 @@
           <a:p>
             <a:fld id="{7E4B12FC-B41C-4527-A942-44ADBFB5AA4E}" type="datetimeFigureOut">
               <a:rPr lang="de-DE" smtClean="0"/>
-              <a:t>09.11.2017</a:t>
+              <a:t>16.11.2017</a:t>
             </a:fld>
             <a:endParaRPr lang="de-DE"/>
           </a:p>
@@ -3956,7 +4772,7 @@
           <a:p>
             <a:fld id="{7E4B12FC-B41C-4527-A942-44ADBFB5AA4E}" type="datetimeFigureOut">
               <a:rPr lang="de-DE" smtClean="0"/>
-              <a:t>09.11.2017</a:t>
+              <a:t>16.11.2017</a:t>
             </a:fld>
             <a:endParaRPr lang="de-DE"/>
           </a:p>
@@ -4051,7 +4867,7 @@
           <a:p>
             <a:fld id="{7E4B12FC-B41C-4527-A942-44ADBFB5AA4E}" type="datetimeFigureOut">
               <a:rPr lang="de-DE" smtClean="0"/>
-              <a:t>09.11.2017</a:t>
+              <a:t>16.11.2017</a:t>
             </a:fld>
             <a:endParaRPr lang="de-DE"/>
           </a:p>
@@ -4306,7 +5122,7 @@
           <a:p>
             <a:fld id="{7E4B12FC-B41C-4527-A942-44ADBFB5AA4E}" type="datetimeFigureOut">
               <a:rPr lang="de-DE" smtClean="0"/>
-              <a:t>09.11.2017</a:t>
+              <a:t>16.11.2017</a:t>
             </a:fld>
             <a:endParaRPr lang="de-DE"/>
           </a:p>
@@ -4569,7 +5385,7 @@
           <a:p>
             <a:fld id="{7E4B12FC-B41C-4527-A942-44ADBFB5AA4E}" type="datetimeFigureOut">
               <a:rPr lang="de-DE" smtClean="0"/>
-              <a:t>09.11.2017</a:t>
+              <a:t>16.11.2017</a:t>
             </a:fld>
             <a:endParaRPr lang="de-DE"/>
           </a:p>
@@ -5312,7 +6128,7 @@
           <a:p>
             <a:fld id="{7E4B12FC-B41C-4527-A942-44ADBFB5AA4E}" type="datetimeFigureOut">
               <a:rPr lang="de-DE" smtClean="0"/>
-              <a:t>09.11.2017</a:t>
+              <a:t>16.11.2017</a:t>
             </a:fld>
             <a:endParaRPr lang="de-DE"/>
           </a:p>
@@ -5859,7 +6675,7 @@
           <a:p>
             <a:r>
               <a:rPr lang="de-DE" dirty="0"/>
-              <a:t>Projektstatusmeeting</a:t>
+              <a:t>2. Projektstatusmeeting</a:t>
             </a:r>
           </a:p>
         </p:txBody>
@@ -5894,7 +6710,7 @@
             </a:br>
             <a:r>
               <a:rPr lang="de-DE" dirty="0"/>
-              <a:t>09.11.2017</a:t>
+              <a:t>16.11.2017</a:t>
             </a:r>
           </a:p>
         </p:txBody>
@@ -5934,7 +6750,7 @@
           <p:cNvPr id="2" name="Titel 1">
             <a:extLst>
               <a:ext uri="{FF2B5EF4-FFF2-40B4-BE49-F238E27FC236}">
-                <a16:creationId xmlns:a16="http://schemas.microsoft.com/office/drawing/2014/main" id="{F1ADACE7-9465-44DB-8888-B87B48B23537}"/>
+                <a16:creationId xmlns:a16="http://schemas.microsoft.com/office/drawing/2014/main" id="{5E7451E9-A73B-43EE-A5BA-498A3B208DFE}"/>
               </a:ext>
             </a:extLst>
           </p:cNvPr>
@@ -5945,14 +6761,19 @@
             <p:ph type="title"/>
           </p:nvPr>
         </p:nvSpPr>
-        <p:spPr/>
+        <p:spPr>
+          <a:xfrm>
+            <a:off x="677334" y="609600"/>
+            <a:ext cx="8596668" cy="1320800"/>
+          </a:xfrm>
+        </p:spPr>
         <p:txBody>
           <a:bodyPr/>
           <a:lstStyle/>
           <a:p>
             <a:r>
               <a:rPr lang="de-DE" dirty="0"/>
-              <a:t>GANTT</a:t>
+              <a:t>Projektstatus 16.11.2017</a:t>
             </a:r>
           </a:p>
         </p:txBody>
@@ -5962,7 +6783,7 @@
           <p:cNvPr id="3" name="Inhaltsplatzhalter 2">
             <a:extLst>
               <a:ext uri="{FF2B5EF4-FFF2-40B4-BE49-F238E27FC236}">
-                <a16:creationId xmlns:a16="http://schemas.microsoft.com/office/drawing/2014/main" id="{F5C40510-0F5A-4AEA-AC4D-4C2BE9BB8C2C}"/>
+                <a16:creationId xmlns:a16="http://schemas.microsoft.com/office/drawing/2014/main" id="{291BAE68-A8FF-4192-A98B-E6ED570EDED3}"/>
               </a:ext>
             </a:extLst>
           </p:cNvPr>
@@ -5975,46 +6796,278 @@
         </p:nvSpPr>
         <p:spPr/>
         <p:txBody>
-          <a:bodyPr/>
+          <a:bodyPr>
+            <a:normAutofit fontScale="92500" lnSpcReduction="10000"/>
+          </a:bodyPr>
           <a:lstStyle/>
           <a:p>
-            <a:endParaRPr lang="de-DE" dirty="0"/>
-          </a:p>
-        </p:txBody>
-      </p:sp>
-      <p:pic>
-        <p:nvPicPr>
-          <p:cNvPr id="4" name="Grafik 3">
+            <a:pPr marL="0" indent="0">
+              <a:buNone/>
+            </a:pPr>
+            <a:r>
+              <a:rPr lang="de-DE" sz="2400" dirty="0"/>
+              <a:t>Letzte Woche</a:t>
+            </a:r>
+          </a:p>
+          <a:p>
+            <a:r>
+              <a:rPr lang="de-DE" sz="1600" dirty="0"/>
+              <a:t>Projektmanager: Überarbeitung des Projektplans + Lastenheft</a:t>
+            </a:r>
+          </a:p>
+          <a:p>
+            <a:r>
+              <a:rPr lang="de-DE" sz="1600" dirty="0"/>
+              <a:t>Technologiemanager: Tutorial für </a:t>
+            </a:r>
+            <a:r>
+              <a:rPr lang="de-DE" sz="1600" dirty="0" err="1"/>
+              <a:t>NodeJS</a:t>
+            </a:r>
+            <a:r>
+              <a:rPr lang="de-DE" sz="1600" dirty="0"/>
+              <a:t>, Login, Registrierung</a:t>
+            </a:r>
+          </a:p>
+          <a:p>
+            <a:r>
+              <a:rPr lang="de-DE" sz="1600" dirty="0"/>
+              <a:t>Qualitätsmanager: Protokoll</a:t>
+            </a:r>
+          </a:p>
+          <a:p>
+            <a:r>
+              <a:rPr lang="de-DE" sz="1600" dirty="0"/>
+              <a:t>Vertriebsmanager: 2. Kundentreffen</a:t>
+            </a:r>
+          </a:p>
+          <a:p>
+            <a:endParaRPr lang="de-DE" sz="1600" dirty="0"/>
+          </a:p>
+          <a:p>
+            <a:pPr marL="0" indent="0">
+              <a:buNone/>
+            </a:pPr>
+            <a:r>
+              <a:rPr lang="de-DE" sz="2400" dirty="0"/>
+              <a:t>Nächste Woche</a:t>
+            </a:r>
+          </a:p>
+          <a:p>
+            <a:r>
+              <a:rPr lang="de-DE" sz="1600" dirty="0"/>
+              <a:t>Technologiemanager: Lastenheft</a:t>
+            </a:r>
+          </a:p>
+          <a:p>
+            <a:r>
+              <a:rPr lang="de-DE" sz="1600" dirty="0"/>
+              <a:t>Projektmanager: Lastenheft</a:t>
+            </a:r>
+          </a:p>
+          <a:p>
+            <a:r>
+              <a:rPr lang="de-DE" sz="1600" dirty="0"/>
+              <a:t>Qualitätsmanager: Lastenheft</a:t>
+            </a:r>
+          </a:p>
+          <a:p>
+            <a:r>
+              <a:rPr lang="de-DE" sz="1600" dirty="0"/>
+              <a:t>Vertriebsmanager: Vorstellung des 2. Kundentreffen, 3. Kundentreffen</a:t>
+            </a:r>
+          </a:p>
+        </p:txBody>
+      </p:sp>
+      <p:sp>
+        <p:nvSpPr>
+          <p:cNvPr id="4" name="Rechteck: abgerundete Ecken 3">
             <a:extLst>
               <a:ext uri="{FF2B5EF4-FFF2-40B4-BE49-F238E27FC236}">
-                <a16:creationId xmlns:a16="http://schemas.microsoft.com/office/drawing/2014/main" id="{8C648949-5A45-4207-91F1-64E709BABAA0}"/>
+                <a16:creationId xmlns:a16="http://schemas.microsoft.com/office/drawing/2014/main" id="{39EF7563-7554-41CE-897C-0D4EEA602E2D}"/>
               </a:ext>
             </a:extLst>
           </p:cNvPr>
-          <p:cNvPicPr>
-            <a:picLocks noChangeAspect="1"/>
-          </p:cNvPicPr>
+          <p:cNvSpPr/>
           <p:nvPr/>
-        </p:nvPicPr>
-        <p:blipFill rotWithShape="1">
-          <a:blip r:embed="rId2"/>
-          <a:srcRect l="9610" r="-1"/>
-          <a:stretch/>
-        </p:blipFill>
+        </p:nvSpPr>
         <p:spPr>
           <a:xfrm>
-            <a:off x="0" y="2160589"/>
-            <a:ext cx="12181341" cy="3059721"/>
+            <a:off x="7803472" y="1930400"/>
+            <a:ext cx="1305018" cy="3568823"/>
           </a:xfrm>
-          <a:prstGeom prst="rect">
+          <a:prstGeom prst="roundRect">
             <a:avLst/>
           </a:prstGeom>
         </p:spPr>
-      </p:pic>
+        <p:style>
+          <a:lnRef idx="2">
+            <a:schemeClr val="dk1">
+              <a:shade val="50000"/>
+            </a:schemeClr>
+          </a:lnRef>
+          <a:fillRef idx="1">
+            <a:schemeClr val="dk1"/>
+          </a:fillRef>
+          <a:effectRef idx="0">
+            <a:schemeClr val="dk1"/>
+          </a:effectRef>
+          <a:fontRef idx="minor">
+            <a:schemeClr val="lt1"/>
+          </a:fontRef>
+        </p:style>
+        <p:txBody>
+          <a:bodyPr rtlCol="0" anchor="ctr"/>
+          <a:lstStyle/>
+          <a:p>
+            <a:pPr algn="ctr"/>
+            <a:endParaRPr lang="de-DE"/>
+          </a:p>
+        </p:txBody>
+      </p:sp>
+      <p:sp>
+        <p:nvSpPr>
+          <p:cNvPr id="5" name="Ellipse 4">
+            <a:extLst>
+              <a:ext uri="{FF2B5EF4-FFF2-40B4-BE49-F238E27FC236}">
+                <a16:creationId xmlns:a16="http://schemas.microsoft.com/office/drawing/2014/main" id="{0887EF24-7328-4943-9104-55EB7B526C8C}"/>
+              </a:ext>
+            </a:extLst>
+          </p:cNvPr>
+          <p:cNvSpPr/>
+          <p:nvPr/>
+        </p:nvSpPr>
+        <p:spPr>
+          <a:xfrm>
+            <a:off x="7958831" y="4382911"/>
+            <a:ext cx="994299" cy="949910"/>
+          </a:xfrm>
+          <a:prstGeom prst="ellipse">
+            <a:avLst/>
+          </a:prstGeom>
+          <a:ln w="76200"/>
+        </p:spPr>
+        <p:style>
+          <a:lnRef idx="2">
+            <a:schemeClr val="accent1">
+              <a:shade val="50000"/>
+            </a:schemeClr>
+          </a:lnRef>
+          <a:fillRef idx="1">
+            <a:schemeClr val="accent1"/>
+          </a:fillRef>
+          <a:effectRef idx="0">
+            <a:schemeClr val="accent1"/>
+          </a:effectRef>
+          <a:fontRef idx="minor">
+            <a:schemeClr val="lt1"/>
+          </a:fontRef>
+        </p:style>
+        <p:txBody>
+          <a:bodyPr rtlCol="0" anchor="ctr"/>
+          <a:lstStyle/>
+          <a:p>
+            <a:pPr algn="ctr"/>
+            <a:endParaRPr lang="de-DE"/>
+          </a:p>
+        </p:txBody>
+      </p:sp>
+      <p:sp>
+        <p:nvSpPr>
+          <p:cNvPr id="6" name="Ellipse 5">
+            <a:extLst>
+              <a:ext uri="{FF2B5EF4-FFF2-40B4-BE49-F238E27FC236}">
+                <a16:creationId xmlns:a16="http://schemas.microsoft.com/office/drawing/2014/main" id="{C47AFAB6-2270-408A-BE0A-A467F037F5CD}"/>
+              </a:ext>
+            </a:extLst>
+          </p:cNvPr>
+          <p:cNvSpPr/>
+          <p:nvPr/>
+        </p:nvSpPr>
+        <p:spPr>
+          <a:xfrm>
+            <a:off x="7954392" y="2005367"/>
+            <a:ext cx="994299" cy="949910"/>
+          </a:xfrm>
+          <a:prstGeom prst="ellipse">
+            <a:avLst/>
+          </a:prstGeom>
+          <a:ln w="76200"/>
+        </p:spPr>
+        <p:style>
+          <a:lnRef idx="2">
+            <a:schemeClr val="accent4"/>
+          </a:lnRef>
+          <a:fillRef idx="1">
+            <a:schemeClr val="lt1"/>
+          </a:fillRef>
+          <a:effectRef idx="0">
+            <a:schemeClr val="accent4"/>
+          </a:effectRef>
+          <a:fontRef idx="minor">
+            <a:schemeClr val="dk1"/>
+          </a:fontRef>
+        </p:style>
+        <p:txBody>
+          <a:bodyPr rtlCol="0" anchor="ctr"/>
+          <a:lstStyle/>
+          <a:p>
+            <a:pPr algn="ctr"/>
+            <a:endParaRPr lang="de-DE"/>
+          </a:p>
+        </p:txBody>
+      </p:sp>
+      <p:sp>
+        <p:nvSpPr>
+          <p:cNvPr id="7" name="Ellipse 6">
+            <a:extLst>
+              <a:ext uri="{FF2B5EF4-FFF2-40B4-BE49-F238E27FC236}">
+                <a16:creationId xmlns:a16="http://schemas.microsoft.com/office/drawing/2014/main" id="{C6D86B27-42B6-4601-AB43-F62C77DE7B38}"/>
+              </a:ext>
+            </a:extLst>
+          </p:cNvPr>
+          <p:cNvSpPr/>
+          <p:nvPr/>
+        </p:nvSpPr>
+        <p:spPr>
+          <a:xfrm>
+            <a:off x="7954392" y="3194139"/>
+            <a:ext cx="994299" cy="949910"/>
+          </a:xfrm>
+          <a:prstGeom prst="ellipse">
+            <a:avLst/>
+          </a:prstGeom>
+          <a:ln w="76200"/>
+        </p:spPr>
+        <p:style>
+          <a:lnRef idx="2">
+            <a:schemeClr val="accent3">
+              <a:shade val="50000"/>
+            </a:schemeClr>
+          </a:lnRef>
+          <a:fillRef idx="1">
+            <a:schemeClr val="accent3"/>
+          </a:fillRef>
+          <a:effectRef idx="0">
+            <a:schemeClr val="accent3"/>
+          </a:effectRef>
+          <a:fontRef idx="minor">
+            <a:schemeClr val="lt1"/>
+          </a:fontRef>
+        </p:style>
+        <p:txBody>
+          <a:bodyPr rtlCol="0" anchor="ctr"/>
+          <a:lstStyle/>
+          <a:p>
+            <a:pPr algn="ctr"/>
+            <a:endParaRPr lang="de-DE"/>
+          </a:p>
+        </p:txBody>
+      </p:sp>
     </p:spTree>
     <p:extLst>
       <p:ext uri="{BB962C8B-B14F-4D97-AF65-F5344CB8AC3E}">
-        <p14:creationId xmlns:p14="http://schemas.microsoft.com/office/powerpoint/2010/main" val="4103241991"/>
+        <p14:creationId xmlns:p14="http://schemas.microsoft.com/office/powerpoint/2010/main" val="2906168188"/>
       </p:ext>
     </p:extLst>
   </p:cSld>
@@ -6046,7 +7099,7 @@
           <p:cNvPr id="2" name="Titel 1">
             <a:extLst>
               <a:ext uri="{FF2B5EF4-FFF2-40B4-BE49-F238E27FC236}">
-                <a16:creationId xmlns:a16="http://schemas.microsoft.com/office/drawing/2014/main" id="{5E7451E9-A73B-43EE-A5BA-498A3B208DFE}"/>
+                <a16:creationId xmlns:a16="http://schemas.microsoft.com/office/drawing/2014/main" id="{F1ADACE7-9465-44DB-8888-B87B48B23537}"/>
               </a:ext>
             </a:extLst>
           </p:cNvPr>
@@ -6057,19 +7110,14 @@
             <p:ph type="title"/>
           </p:nvPr>
         </p:nvSpPr>
-        <p:spPr>
-          <a:xfrm>
-            <a:off x="677334" y="609600"/>
-            <a:ext cx="8596668" cy="1320800"/>
-          </a:xfrm>
-        </p:spPr>
+        <p:spPr/>
         <p:txBody>
           <a:bodyPr/>
           <a:lstStyle/>
           <a:p>
             <a:r>
               <a:rPr lang="de-DE" dirty="0"/>
-              <a:t>Projektstatus 09.11.2017</a:t>
+              <a:t>GANTT</a:t>
             </a:r>
           </a:p>
         </p:txBody>
@@ -6079,7 +7127,7 @@
           <p:cNvPr id="3" name="Inhaltsplatzhalter 2">
             <a:extLst>
               <a:ext uri="{FF2B5EF4-FFF2-40B4-BE49-F238E27FC236}">
-                <a16:creationId xmlns:a16="http://schemas.microsoft.com/office/drawing/2014/main" id="{291BAE68-A8FF-4192-A98B-E6ED570EDED3}"/>
+                <a16:creationId xmlns:a16="http://schemas.microsoft.com/office/drawing/2014/main" id="{F5C40510-0F5A-4AEA-AC4D-4C2BE9BB8C2C}"/>
               </a:ext>
             </a:extLst>
           </p:cNvPr>
@@ -6093,273 +7141,60 @@
         <p:spPr/>
         <p:txBody>
           <a:bodyPr>
-            <a:normAutofit fontScale="92500" lnSpcReduction="20000"/>
+            <a:normAutofit/>
           </a:bodyPr>
           <a:lstStyle/>
           <a:p>
+            <a:endParaRPr lang="de-DE" sz="2800" dirty="0"/>
+          </a:p>
+          <a:p>
             <a:pPr marL="0" indent="0">
               <a:buNone/>
             </a:pPr>
-            <a:r>
-              <a:rPr lang="de-DE" sz="2400" dirty="0"/>
-              <a:t>Seit Projektbeginn</a:t>
-            </a:r>
-          </a:p>
-          <a:p>
-            <a:r>
-              <a:rPr lang="de-DE" sz="1600" dirty="0"/>
-              <a:t>Alle: Rollenverteilung</a:t>
-            </a:r>
-          </a:p>
-          <a:p>
-            <a:r>
-              <a:rPr lang="de-DE" sz="1600" dirty="0"/>
-              <a:t>Lastenheft strukturieren</a:t>
-            </a:r>
-          </a:p>
-          <a:p>
-            <a:r>
-              <a:rPr lang="de-DE" sz="1600" dirty="0"/>
-              <a:t>Use Cases beschreiben</a:t>
-            </a:r>
-          </a:p>
-          <a:p>
-            <a:r>
-              <a:rPr lang="de-DE" sz="1600" dirty="0"/>
-              <a:t>Mockups</a:t>
-            </a:r>
-          </a:p>
-          <a:p>
-            <a:r>
-              <a:rPr lang="de-DE" sz="1600" dirty="0"/>
-              <a:t>Technologie auswählen</a:t>
-            </a:r>
-          </a:p>
-          <a:p>
-            <a:endParaRPr lang="de-DE" sz="1600" dirty="0"/>
-          </a:p>
-          <a:p>
-            <a:pPr marL="0" indent="0">
-              <a:buNone/>
-            </a:pPr>
-            <a:r>
-              <a:rPr lang="de-DE" sz="2400" dirty="0"/>
-              <a:t>Nächste Woche</a:t>
-            </a:r>
-          </a:p>
-          <a:p>
-            <a:r>
-              <a:rPr lang="de-DE" sz="1600" dirty="0"/>
-              <a:t>Technologiemanager: Projekt anlegen, Tutorials für alle bereitstellen</a:t>
-            </a:r>
-          </a:p>
-          <a:p>
-            <a:r>
-              <a:rPr lang="de-DE" sz="1600" dirty="0"/>
-              <a:t>Projektmanager: Lastenheft + Mockups</a:t>
-            </a:r>
-          </a:p>
-          <a:p>
-            <a:r>
-              <a:rPr lang="de-DE" sz="1600" dirty="0"/>
-              <a:t>Qualitätsmanager: Korrektur Lastenheft</a:t>
-            </a:r>
-          </a:p>
-          <a:p>
-            <a:r>
-              <a:rPr lang="de-DE" sz="1600" dirty="0"/>
-              <a:t>Vertriebsmanager: Vorstellung Mockups beim Kunden</a:t>
-            </a:r>
-          </a:p>
-        </p:txBody>
-      </p:sp>
-      <p:sp>
-        <p:nvSpPr>
-          <p:cNvPr id="4" name="Rechteck: abgerundete Ecken 3">
+            <a:endParaRPr lang="de-DE" sz="2800" dirty="0"/>
+          </a:p>
+          <a:p>
+            <a:r>
+              <a:rPr lang="de-DE" sz="2800" dirty="0"/>
+              <a:t>Siehe Project…</a:t>
+            </a:r>
+          </a:p>
+        </p:txBody>
+      </p:sp>
+      <p:pic>
+        <p:nvPicPr>
+          <p:cNvPr id="5" name="Grafik 4">
             <a:extLst>
               <a:ext uri="{FF2B5EF4-FFF2-40B4-BE49-F238E27FC236}">
-                <a16:creationId xmlns:a16="http://schemas.microsoft.com/office/drawing/2014/main" id="{39EF7563-7554-41CE-897C-0D4EEA602E2D}"/>
+                <a16:creationId xmlns:a16="http://schemas.microsoft.com/office/drawing/2014/main" id="{A49953F6-0945-4FC2-8A23-A19DCB7A0CD7}"/>
               </a:ext>
             </a:extLst>
           </p:cNvPr>
-          <p:cNvSpPr/>
+          <p:cNvPicPr>
+            <a:picLocks noChangeAspect="1"/>
+          </p:cNvPicPr>
           <p:nvPr/>
-        </p:nvSpPr>
+        </p:nvPicPr>
+        <p:blipFill>
+          <a:blip r:embed="rId2"/>
+          <a:stretch>
+            <a:fillRect/>
+          </a:stretch>
+        </p:blipFill>
         <p:spPr>
           <a:xfrm>
-            <a:off x="7803472" y="1930400"/>
-            <a:ext cx="1305018" cy="3568823"/>
+            <a:off x="238125" y="1270000"/>
+            <a:ext cx="11544300" cy="5095875"/>
           </a:xfrm>
-          <a:prstGeom prst="roundRect">
+          <a:prstGeom prst="rect">
             <a:avLst/>
           </a:prstGeom>
         </p:spPr>
-        <p:style>
-          <a:lnRef idx="2">
-            <a:schemeClr val="dk1">
-              <a:shade val="50000"/>
-            </a:schemeClr>
-          </a:lnRef>
-          <a:fillRef idx="1">
-            <a:schemeClr val="dk1"/>
-          </a:fillRef>
-          <a:effectRef idx="0">
-            <a:schemeClr val="dk1"/>
-          </a:effectRef>
-          <a:fontRef idx="minor">
-            <a:schemeClr val="lt1"/>
-          </a:fontRef>
-        </p:style>
-        <p:txBody>
-          <a:bodyPr rtlCol="0" anchor="ctr"/>
-          <a:lstStyle/>
-          <a:p>
-            <a:pPr algn="ctr"/>
-            <a:endParaRPr lang="de-DE"/>
-          </a:p>
-        </p:txBody>
-      </p:sp>
-      <p:sp>
-        <p:nvSpPr>
-          <p:cNvPr id="5" name="Ellipse 4">
-            <a:extLst>
-              <a:ext uri="{FF2B5EF4-FFF2-40B4-BE49-F238E27FC236}">
-                <a16:creationId xmlns:a16="http://schemas.microsoft.com/office/drawing/2014/main" id="{0887EF24-7328-4943-9104-55EB7B526C8C}"/>
-              </a:ext>
-            </a:extLst>
-          </p:cNvPr>
-          <p:cNvSpPr/>
-          <p:nvPr/>
-        </p:nvSpPr>
-        <p:spPr>
-          <a:xfrm>
-            <a:off x="7958831" y="4382911"/>
-            <a:ext cx="994299" cy="949910"/>
-          </a:xfrm>
-          <a:prstGeom prst="ellipse">
-            <a:avLst/>
-          </a:prstGeom>
-          <a:ln w="76200"/>
-        </p:spPr>
-        <p:style>
-          <a:lnRef idx="2">
-            <a:schemeClr val="accent1"/>
-          </a:lnRef>
-          <a:fillRef idx="1">
-            <a:schemeClr val="lt1"/>
-          </a:fillRef>
-          <a:effectRef idx="0">
-            <a:schemeClr val="accent1"/>
-          </a:effectRef>
-          <a:fontRef idx="minor">
-            <a:schemeClr val="dk1"/>
-          </a:fontRef>
-        </p:style>
-        <p:txBody>
-          <a:bodyPr rtlCol="0" anchor="ctr"/>
-          <a:lstStyle/>
-          <a:p>
-            <a:pPr algn="ctr"/>
-            <a:endParaRPr lang="de-DE"/>
-          </a:p>
-        </p:txBody>
-      </p:sp>
-      <p:sp>
-        <p:nvSpPr>
-          <p:cNvPr id="6" name="Ellipse 5">
-            <a:extLst>
-              <a:ext uri="{FF2B5EF4-FFF2-40B4-BE49-F238E27FC236}">
-                <a16:creationId xmlns:a16="http://schemas.microsoft.com/office/drawing/2014/main" id="{C47AFAB6-2270-408A-BE0A-A467F037F5CD}"/>
-              </a:ext>
-            </a:extLst>
-          </p:cNvPr>
-          <p:cNvSpPr/>
-          <p:nvPr/>
-        </p:nvSpPr>
-        <p:spPr>
-          <a:xfrm>
-            <a:off x="7954392" y="2005367"/>
-            <a:ext cx="994299" cy="949910"/>
-          </a:xfrm>
-          <a:prstGeom prst="ellipse">
-            <a:avLst/>
-          </a:prstGeom>
-          <a:ln w="76200"/>
-        </p:spPr>
-        <p:style>
-          <a:lnRef idx="2">
-            <a:schemeClr val="accent4"/>
-          </a:lnRef>
-          <a:fillRef idx="1">
-            <a:schemeClr val="lt1"/>
-          </a:fillRef>
-          <a:effectRef idx="0">
-            <a:schemeClr val="accent4"/>
-          </a:effectRef>
-          <a:fontRef idx="minor">
-            <a:schemeClr val="dk1"/>
-          </a:fontRef>
-        </p:style>
-        <p:txBody>
-          <a:bodyPr rtlCol="0" anchor="ctr"/>
-          <a:lstStyle/>
-          <a:p>
-            <a:pPr algn="ctr"/>
-            <a:endParaRPr lang="de-DE"/>
-          </a:p>
-        </p:txBody>
-      </p:sp>
-      <p:sp>
-        <p:nvSpPr>
-          <p:cNvPr id="7" name="Ellipse 6">
-            <a:extLst>
-              <a:ext uri="{FF2B5EF4-FFF2-40B4-BE49-F238E27FC236}">
-                <a16:creationId xmlns:a16="http://schemas.microsoft.com/office/drawing/2014/main" id="{C6D86B27-42B6-4601-AB43-F62C77DE7B38}"/>
-              </a:ext>
-            </a:extLst>
-          </p:cNvPr>
-          <p:cNvSpPr/>
-          <p:nvPr/>
-        </p:nvSpPr>
-        <p:spPr>
-          <a:xfrm>
-            <a:off x="7954392" y="3194139"/>
-            <a:ext cx="994299" cy="949910"/>
-          </a:xfrm>
-          <a:prstGeom prst="ellipse">
-            <a:avLst/>
-          </a:prstGeom>
-          <a:ln w="76200"/>
-        </p:spPr>
-        <p:style>
-          <a:lnRef idx="2">
-            <a:schemeClr val="accent3">
-              <a:shade val="50000"/>
-            </a:schemeClr>
-          </a:lnRef>
-          <a:fillRef idx="1">
-            <a:schemeClr val="accent3"/>
-          </a:fillRef>
-          <a:effectRef idx="0">
-            <a:schemeClr val="accent3"/>
-          </a:effectRef>
-          <a:fontRef idx="minor">
-            <a:schemeClr val="lt1"/>
-          </a:fontRef>
-        </p:style>
-        <p:txBody>
-          <a:bodyPr rtlCol="0" anchor="ctr"/>
-          <a:lstStyle/>
-          <a:p>
-            <a:pPr algn="ctr"/>
-            <a:endParaRPr lang="de-DE"/>
-          </a:p>
-        </p:txBody>
-      </p:sp>
+      </p:pic>
     </p:spTree>
     <p:extLst>
       <p:ext uri="{BB962C8B-B14F-4D97-AF65-F5344CB8AC3E}">
-        <p14:creationId xmlns:p14="http://schemas.microsoft.com/office/powerpoint/2010/main" val="2906168188"/>
+        <p14:creationId xmlns:p14="http://schemas.microsoft.com/office/powerpoint/2010/main" val="2065519168"/>
       </p:ext>
     </p:extLst>
   </p:cSld>
@@ -6391,6 +7226,246 @@
           <p:cNvPr id="2" name="Titel 1">
             <a:extLst>
               <a:ext uri="{FF2B5EF4-FFF2-40B4-BE49-F238E27FC236}">
+                <a16:creationId xmlns:a16="http://schemas.microsoft.com/office/drawing/2014/main" id="{F1ADACE7-9465-44DB-8888-B87B48B23537}"/>
+              </a:ext>
+            </a:extLst>
+          </p:cNvPr>
+          <p:cNvSpPr>
+            <a:spLocks noGrp="1"/>
+          </p:cNvSpPr>
+          <p:nvPr>
+            <p:ph type="title"/>
+          </p:nvPr>
+        </p:nvSpPr>
+        <p:spPr/>
+        <p:txBody>
+          <a:bodyPr/>
+          <a:lstStyle/>
+          <a:p>
+            <a:r>
+              <a:rPr lang="de-DE" dirty="0"/>
+              <a:t>Aktueller Stand</a:t>
+            </a:r>
+          </a:p>
+        </p:txBody>
+      </p:sp>
+      <p:graphicFrame>
+        <p:nvGraphicFramePr>
+          <p:cNvPr id="6" name="Diagramm 5">
+            <a:extLst>
+              <a:ext uri="{FF2B5EF4-FFF2-40B4-BE49-F238E27FC236}">
+                <a16:creationId xmlns:a16="http://schemas.microsoft.com/office/drawing/2014/main" id="{FE935EFA-5BFB-4B90-B3FE-B19A92F353D9}"/>
+              </a:ext>
+            </a:extLst>
+          </p:cNvPr>
+          <p:cNvGraphicFramePr>
+            <a:graphicFrameLocks/>
+          </p:cNvGraphicFramePr>
+          <p:nvPr>
+            <p:extLst>
+              <p:ext uri="{D42A27DB-BD31-4B8C-83A1-F6EECF244321}">
+                <p14:modId xmlns:p14="http://schemas.microsoft.com/office/powerpoint/2010/main" val="3376656045"/>
+              </p:ext>
+            </p:extLst>
+          </p:nvPr>
+        </p:nvGraphicFramePr>
+        <p:xfrm>
+          <a:off x="781050" y="1381125"/>
+          <a:ext cx="8191500" cy="4581525"/>
+        </p:xfrm>
+        <a:graphic>
+          <a:graphicData uri="http://schemas.openxmlformats.org/drawingml/2006/chart">
+            <c:chart xmlns:c="http://schemas.openxmlformats.org/drawingml/2006/chart" xmlns:r="http://schemas.openxmlformats.org/officeDocument/2006/relationships" r:id="rId2"/>
+          </a:graphicData>
+        </a:graphic>
+      </p:graphicFrame>
+    </p:spTree>
+    <p:extLst>
+      <p:ext uri="{BB962C8B-B14F-4D97-AF65-F5344CB8AC3E}">
+        <p14:creationId xmlns:p14="http://schemas.microsoft.com/office/powerpoint/2010/main" val="4103241991"/>
+      </p:ext>
+    </p:extLst>
+  </p:cSld>
+  <p:clrMapOvr>
+    <a:masterClrMapping/>
+  </p:clrMapOvr>
+</p:sld>
+</file>
+
+<file path=ppt/slides/slide5.xml><?xml version="1.0" encoding="utf-8"?>
+<p:sld xmlns:a="http://schemas.openxmlformats.org/drawingml/2006/main" xmlns:r="http://schemas.openxmlformats.org/officeDocument/2006/relationships" xmlns:p="http://schemas.openxmlformats.org/presentationml/2006/main">
+  <p:cSld>
+    <p:spTree>
+      <p:nvGrpSpPr>
+        <p:cNvPr id="1" name=""/>
+        <p:cNvGrpSpPr/>
+        <p:nvPr/>
+      </p:nvGrpSpPr>
+      <p:grpSpPr>
+        <a:xfrm>
+          <a:off x="0" y="0"/>
+          <a:ext cx="0" cy="0"/>
+          <a:chOff x="0" y="0"/>
+          <a:chExt cx="0" cy="0"/>
+        </a:xfrm>
+      </p:grpSpPr>
+      <p:sp>
+        <p:nvSpPr>
+          <p:cNvPr id="2" name="Titel 1">
+            <a:extLst>
+              <a:ext uri="{FF2B5EF4-FFF2-40B4-BE49-F238E27FC236}">
+                <a16:creationId xmlns:a16="http://schemas.microsoft.com/office/drawing/2014/main" id="{F1BCACEE-1DEE-4F41-97CD-A846C78D713B}"/>
+              </a:ext>
+            </a:extLst>
+          </p:cNvPr>
+          <p:cNvSpPr>
+            <a:spLocks noGrp="1"/>
+          </p:cNvSpPr>
+          <p:nvPr>
+            <p:ph type="title"/>
+          </p:nvPr>
+        </p:nvSpPr>
+        <p:spPr/>
+        <p:txBody>
+          <a:bodyPr/>
+          <a:lstStyle/>
+          <a:p>
+            <a:r>
+              <a:rPr lang="de-DE" dirty="0"/>
+              <a:t>Stand Lastenheft</a:t>
+            </a:r>
+          </a:p>
+        </p:txBody>
+      </p:sp>
+      <p:sp>
+        <p:nvSpPr>
+          <p:cNvPr id="3" name="Inhaltsplatzhalter 2">
+            <a:extLst>
+              <a:ext uri="{FF2B5EF4-FFF2-40B4-BE49-F238E27FC236}">
+                <a16:creationId xmlns:a16="http://schemas.microsoft.com/office/drawing/2014/main" id="{88114565-A84D-4D25-A812-AB968D99F896}"/>
+              </a:ext>
+            </a:extLst>
+          </p:cNvPr>
+          <p:cNvSpPr>
+            <a:spLocks noGrp="1"/>
+          </p:cNvSpPr>
+          <p:nvPr>
+            <p:ph idx="1"/>
+          </p:nvPr>
+        </p:nvSpPr>
+        <p:spPr/>
+        <p:txBody>
+          <a:bodyPr/>
+          <a:lstStyle/>
+          <a:p>
+            <a:r>
+              <a:rPr lang="de-DE" dirty="0"/>
+              <a:t>Fertig:</a:t>
+            </a:r>
+          </a:p>
+          <a:p>
+            <a:pPr lvl="1"/>
+            <a:r>
+              <a:rPr lang="de-DE" dirty="0"/>
+              <a:t>Struktur, Nutzen, Anwendergruppen</a:t>
+            </a:r>
+          </a:p>
+          <a:p>
+            <a:pPr lvl="1"/>
+            <a:r>
+              <a:rPr lang="de-DE" dirty="0"/>
+              <a:t>10 Seiten Oberflächen und Use Cases beschrieben (ca. 30%)</a:t>
+            </a:r>
+          </a:p>
+          <a:p>
+            <a:pPr lvl="1"/>
+            <a:endParaRPr lang="de-DE" dirty="0"/>
+          </a:p>
+          <a:p>
+            <a:r>
+              <a:rPr lang="de-DE" dirty="0"/>
+              <a:t>Es fehlt:</a:t>
+            </a:r>
+          </a:p>
+          <a:p>
+            <a:pPr lvl="1"/>
+            <a:r>
+              <a:rPr lang="de-DE" dirty="0"/>
+              <a:t>Informationen aus dem 2. Kundentreffen (Calvin und Marin)</a:t>
+            </a:r>
+          </a:p>
+          <a:p>
+            <a:pPr lvl="1"/>
+            <a:r>
+              <a:rPr lang="de-DE" dirty="0"/>
+              <a:t>Oberflächen und Use Cases fertigstellen (Jana, Marcel, Calvin)</a:t>
+            </a:r>
+          </a:p>
+          <a:p>
+            <a:pPr lvl="1"/>
+            <a:r>
+              <a:rPr lang="de-DE" dirty="0"/>
+              <a:t>Beschreibung der Technologie (Tobias und Nils)</a:t>
+            </a:r>
+          </a:p>
+          <a:p>
+            <a:pPr lvl="1"/>
+            <a:r>
+              <a:rPr lang="de-DE" dirty="0"/>
+              <a:t>Qualitätsanforderungen (Jonas und Marin)</a:t>
+            </a:r>
+          </a:p>
+          <a:p>
+            <a:pPr lvl="1"/>
+            <a:endParaRPr lang="de-DE" dirty="0"/>
+          </a:p>
+          <a:p>
+            <a:pPr lvl="1"/>
+            <a:endParaRPr lang="de-DE" dirty="0"/>
+          </a:p>
+          <a:p>
+            <a:endParaRPr lang="de-DE" dirty="0"/>
+          </a:p>
+          <a:p>
+            <a:endParaRPr lang="de-DE" dirty="0"/>
+          </a:p>
+        </p:txBody>
+      </p:sp>
+    </p:spTree>
+    <p:extLst>
+      <p:ext uri="{BB962C8B-B14F-4D97-AF65-F5344CB8AC3E}">
+        <p14:creationId xmlns:p14="http://schemas.microsoft.com/office/powerpoint/2010/main" val="2574256466"/>
+      </p:ext>
+    </p:extLst>
+  </p:cSld>
+  <p:clrMapOvr>
+    <a:masterClrMapping/>
+  </p:clrMapOvr>
+</p:sld>
+</file>
+
+<file path=ppt/slides/slide6.xml><?xml version="1.0" encoding="utf-8"?>
+<p:sld xmlns:a="http://schemas.openxmlformats.org/drawingml/2006/main" xmlns:r="http://schemas.openxmlformats.org/officeDocument/2006/relationships" xmlns:p="http://schemas.openxmlformats.org/presentationml/2006/main">
+  <p:cSld>
+    <p:spTree>
+      <p:nvGrpSpPr>
+        <p:cNvPr id="1" name=""/>
+        <p:cNvGrpSpPr/>
+        <p:nvPr/>
+      </p:nvGrpSpPr>
+      <p:grpSpPr>
+        <a:xfrm>
+          <a:off x="0" y="0"/>
+          <a:ext cx="0" cy="0"/>
+          <a:chOff x="0" y="0"/>
+          <a:chExt cx="0" cy="0"/>
+        </a:xfrm>
+      </p:grpSpPr>
+      <p:sp>
+        <p:nvSpPr>
+          <p:cNvPr id="2" name="Titel 1">
+            <a:extLst>
+              <a:ext uri="{FF2B5EF4-FFF2-40B4-BE49-F238E27FC236}">
                 <a16:creationId xmlns:a16="http://schemas.microsoft.com/office/drawing/2014/main" id="{7D823FA2-6F28-48CD-B4AD-4989D2EE955C}"/>
               </a:ext>
             </a:extLst>
@@ -6408,8 +7483,8 @@
           <a:lstStyle/>
           <a:p>
             <a:r>
-              <a:rPr lang="de-DE"/>
-              <a:t>Projektstatus 09.11.2017</a:t>
+              <a:rPr lang="de-DE" dirty="0"/>
+              <a:t>Projektstatus 16.11.2017</a:t>
             </a:r>
           </a:p>
         </p:txBody>
@@ -6430,7 +7505,7 @@
             <p:ph idx="1"/>
             <p:extLst>
               <p:ext uri="{D42A27DB-BD31-4B8C-83A1-F6EECF244321}">
-                <p14:modId xmlns:p14="http://schemas.microsoft.com/office/powerpoint/2010/main" val="2692877587"/>
+                <p14:modId xmlns:p14="http://schemas.microsoft.com/office/powerpoint/2010/main" val="2801448548"/>
               </p:ext>
             </p:extLst>
           </p:nvPr>
@@ -6570,7 +7645,7 @@
                     <a:p>
                       <a:r>
                         <a:rPr lang="de-DE" b="1" dirty="0"/>
-                        <a:t>21</a:t>
+                        <a:t>20</a:t>
                       </a:r>
                     </a:p>
                   </a:txBody>
@@ -6583,7 +7658,7 @@
                     <a:p>
                       <a:r>
                         <a:rPr lang="de-DE" b="1" dirty="0"/>
-                        <a:t>21</a:t>
+                        <a:t>41</a:t>
                       </a:r>
                     </a:p>
                   </a:txBody>
@@ -6626,7 +7701,7 @@
                     <a:p>
                       <a:r>
                         <a:rPr lang="de-DE" dirty="0"/>
-                        <a:t>11</a:t>
+                        <a:t>9</a:t>
                       </a:r>
                     </a:p>
                   </a:txBody>
@@ -6639,7 +7714,7 @@
                     <a:p>
                       <a:r>
                         <a:rPr lang="de-DE" dirty="0"/>
-                        <a:t>11</a:t>
+                        <a:t>20</a:t>
                       </a:r>
                     </a:p>
                   </a:txBody>
@@ -6682,7 +7757,7 @@
                     <a:p>
                       <a:r>
                         <a:rPr lang="de-DE" dirty="0"/>
-                        <a:t>10</a:t>
+                        <a:t>11</a:t>
                       </a:r>
                     </a:p>
                   </a:txBody>
@@ -6695,7 +7770,7 @@
                     <a:p>
                       <a:r>
                         <a:rPr lang="de-DE" dirty="0"/>
-                        <a:t>10</a:t>
+                        <a:t>21</a:t>
                       </a:r>
                     </a:p>
                   </a:txBody>
@@ -6738,7 +7813,7 @@
                     <a:p>
                       <a:r>
                         <a:rPr lang="de-DE" b="1" dirty="0"/>
-                        <a:t>22</a:t>
+                        <a:t>15</a:t>
                       </a:r>
                     </a:p>
                   </a:txBody>
@@ -6751,7 +7826,7 @@
                     <a:p>
                       <a:r>
                         <a:rPr lang="de-DE" b="1" dirty="0"/>
-                        <a:t>22</a:t>
+                        <a:t>37</a:t>
                       </a:r>
                     </a:p>
                   </a:txBody>
@@ -6799,7 +7874,7 @@
                     <a:p>
                       <a:r>
                         <a:rPr lang="de-DE" dirty="0"/>
-                        <a:t>12</a:t>
+                        <a:t>7</a:t>
                       </a:r>
                     </a:p>
                   </a:txBody>
@@ -6812,7 +7887,7 @@
                     <a:p>
                       <a:r>
                         <a:rPr lang="de-DE" dirty="0"/>
-                        <a:t>12</a:t>
+                        <a:t>19</a:t>
                       </a:r>
                     </a:p>
                   </a:txBody>
@@ -6855,7 +7930,7 @@
                     <a:p>
                       <a:r>
                         <a:rPr lang="de-DE" dirty="0"/>
-                        <a:t>10</a:t>
+                        <a:t>8</a:t>
                       </a:r>
                     </a:p>
                   </a:txBody>
@@ -6868,7 +7943,7 @@
                     <a:p>
                       <a:r>
                         <a:rPr lang="de-DE" dirty="0"/>
-                        <a:t>10</a:t>
+                        <a:t>18</a:t>
                       </a:r>
                     </a:p>
                   </a:txBody>
@@ -6911,7 +7986,7 @@
                     <a:p>
                       <a:r>
                         <a:rPr lang="de-DE" b="1" dirty="0"/>
-                        <a:t>14</a:t>
+                        <a:t>22</a:t>
                       </a:r>
                     </a:p>
                   </a:txBody>
@@ -6924,7 +7999,7 @@
                     <a:p>
                       <a:r>
                         <a:rPr lang="de-DE" b="1" dirty="0"/>
-                        <a:t>14</a:t>
+                        <a:t>36</a:t>
                       </a:r>
                     </a:p>
                   </a:txBody>
@@ -6967,7 +8042,7 @@
                     <a:p>
                       <a:r>
                         <a:rPr lang="de-DE" dirty="0"/>
-                        <a:t>7</a:t>
+                        <a:t>14</a:t>
                       </a:r>
                     </a:p>
                   </a:txBody>
@@ -6980,7 +8055,7 @@
                     <a:p>
                       <a:r>
                         <a:rPr lang="de-DE" dirty="0"/>
-                        <a:t>7</a:t>
+                        <a:t>21</a:t>
                       </a:r>
                     </a:p>
                   </a:txBody>
@@ -7023,7 +8098,7 @@
                     <a:p>
                       <a:r>
                         <a:rPr lang="de-DE" dirty="0"/>
-                        <a:t>7</a:t>
+                        <a:t>8</a:t>
                       </a:r>
                     </a:p>
                   </a:txBody>
@@ -7036,7 +8111,7 @@
                     <a:p>
                       <a:r>
                         <a:rPr lang="de-DE" dirty="0"/>
-                        <a:t>7</a:t>
+                        <a:t>15</a:t>
                       </a:r>
                     </a:p>
                   </a:txBody>
@@ -7082,7 +8157,7 @@
                     <a:p>
                       <a:r>
                         <a:rPr lang="de-DE" b="1" dirty="0"/>
-                        <a:t>6</a:t>
+                        <a:t>7</a:t>
                       </a:r>
                     </a:p>
                   </a:txBody>
@@ -7095,7 +8170,7 @@
                     <a:p>
                       <a:r>
                         <a:rPr lang="de-DE" b="1" dirty="0"/>
-                        <a:t>6</a:t>
+                        <a:t>13</a:t>
                       </a:r>
                     </a:p>
                   </a:txBody>

</xml_diff>